<commit_message>
Update from SVN after first freeze.
</commit_message>
<xml_diff>
--- a/guides/sdc/sdc-generic-workflow.pptx
+++ b/guides/sdc/sdc-generic-workflow.pptx
@@ -289,7 +289,7 @@
             <a:fld id="{C69E31BE-431C-4F96-86FE-0099C953F73C}" type="datetimeFigureOut">
               <a:rPr lang="en-US" smtClean="0"/>
               <a:pPr/>
-              <a:t>4/2/2015</a:t>
+              <a:t>8/28/2015</a:t>
             </a:fld>
             <a:endParaRPr lang="en-US"/>
           </a:p>
@@ -341,7 +341,7 @@
     </p:spTree>
     <p:extLst>
       <p:ext uri="{BB962C8B-B14F-4D97-AF65-F5344CB8AC3E}">
-        <p14:creationId xmlns="" xmlns:p14="http://schemas.microsoft.com/office/powerpoint/2010/main" val="2187467626"/>
+        <p14:creationId xmlns:p14="http://schemas.microsoft.com/office/powerpoint/2010/main" xmlns="" val="2187467626"/>
       </p:ext>
     </p:extLst>
   </p:cSld>
@@ -461,7 +461,7 @@
             <a:fld id="{C69E31BE-431C-4F96-86FE-0099C953F73C}" type="datetimeFigureOut">
               <a:rPr lang="en-US" smtClean="0"/>
               <a:pPr/>
-              <a:t>4/2/2015</a:t>
+              <a:t>8/28/2015</a:t>
             </a:fld>
             <a:endParaRPr lang="en-US"/>
           </a:p>
@@ -513,7 +513,7 @@
     </p:spTree>
     <p:extLst>
       <p:ext uri="{BB962C8B-B14F-4D97-AF65-F5344CB8AC3E}">
-        <p14:creationId xmlns="" xmlns:p14="http://schemas.microsoft.com/office/powerpoint/2010/main" val="790259655"/>
+        <p14:creationId xmlns:p14="http://schemas.microsoft.com/office/powerpoint/2010/main" xmlns="" val="790259655"/>
       </p:ext>
     </p:extLst>
   </p:cSld>
@@ -643,7 +643,7 @@
             <a:fld id="{C69E31BE-431C-4F96-86FE-0099C953F73C}" type="datetimeFigureOut">
               <a:rPr lang="en-US" smtClean="0"/>
               <a:pPr/>
-              <a:t>4/2/2015</a:t>
+              <a:t>8/28/2015</a:t>
             </a:fld>
             <a:endParaRPr lang="en-US"/>
           </a:p>
@@ -695,7 +695,7 @@
     </p:spTree>
     <p:extLst>
       <p:ext uri="{BB962C8B-B14F-4D97-AF65-F5344CB8AC3E}">
-        <p14:creationId xmlns="" xmlns:p14="http://schemas.microsoft.com/office/powerpoint/2010/main" val="502563980"/>
+        <p14:creationId xmlns:p14="http://schemas.microsoft.com/office/powerpoint/2010/main" xmlns="" val="502563980"/>
       </p:ext>
     </p:extLst>
   </p:cSld>
@@ -815,7 +815,7 @@
             <a:fld id="{C69E31BE-431C-4F96-86FE-0099C953F73C}" type="datetimeFigureOut">
               <a:rPr lang="en-US" smtClean="0"/>
               <a:pPr/>
-              <a:t>4/2/2015</a:t>
+              <a:t>8/28/2015</a:t>
             </a:fld>
             <a:endParaRPr lang="en-US"/>
           </a:p>
@@ -867,7 +867,7 @@
     </p:spTree>
     <p:extLst>
       <p:ext uri="{BB962C8B-B14F-4D97-AF65-F5344CB8AC3E}">
-        <p14:creationId xmlns="" xmlns:p14="http://schemas.microsoft.com/office/powerpoint/2010/main" val="4133789058"/>
+        <p14:creationId xmlns:p14="http://schemas.microsoft.com/office/powerpoint/2010/main" xmlns="" val="4133789058"/>
       </p:ext>
     </p:extLst>
   </p:cSld>
@@ -1063,7 +1063,7 @@
             <a:fld id="{C69E31BE-431C-4F96-86FE-0099C953F73C}" type="datetimeFigureOut">
               <a:rPr lang="en-US" smtClean="0"/>
               <a:pPr/>
-              <a:t>4/2/2015</a:t>
+              <a:t>8/28/2015</a:t>
             </a:fld>
             <a:endParaRPr lang="en-US"/>
           </a:p>
@@ -1115,7 +1115,7 @@
     </p:spTree>
     <p:extLst>
       <p:ext uri="{BB962C8B-B14F-4D97-AF65-F5344CB8AC3E}">
-        <p14:creationId xmlns="" xmlns:p14="http://schemas.microsoft.com/office/powerpoint/2010/main" val="458461516"/>
+        <p14:creationId xmlns:p14="http://schemas.microsoft.com/office/powerpoint/2010/main" xmlns="" val="458461516"/>
       </p:ext>
     </p:extLst>
   </p:cSld>
@@ -1353,7 +1353,7 @@
             <a:fld id="{C69E31BE-431C-4F96-86FE-0099C953F73C}" type="datetimeFigureOut">
               <a:rPr lang="en-US" smtClean="0"/>
               <a:pPr/>
-              <a:t>4/2/2015</a:t>
+              <a:t>8/28/2015</a:t>
             </a:fld>
             <a:endParaRPr lang="en-US"/>
           </a:p>
@@ -1405,7 +1405,7 @@
     </p:spTree>
     <p:extLst>
       <p:ext uri="{BB962C8B-B14F-4D97-AF65-F5344CB8AC3E}">
-        <p14:creationId xmlns="" xmlns:p14="http://schemas.microsoft.com/office/powerpoint/2010/main" val="797418400"/>
+        <p14:creationId xmlns:p14="http://schemas.microsoft.com/office/powerpoint/2010/main" xmlns="" val="797418400"/>
       </p:ext>
     </p:extLst>
   </p:cSld>
@@ -1777,7 +1777,7 @@
             <a:fld id="{C69E31BE-431C-4F96-86FE-0099C953F73C}" type="datetimeFigureOut">
               <a:rPr lang="en-US" smtClean="0"/>
               <a:pPr/>
-              <a:t>4/2/2015</a:t>
+              <a:t>8/28/2015</a:t>
             </a:fld>
             <a:endParaRPr lang="en-US"/>
           </a:p>
@@ -1829,7 +1829,7 @@
     </p:spTree>
     <p:extLst>
       <p:ext uri="{BB962C8B-B14F-4D97-AF65-F5344CB8AC3E}">
-        <p14:creationId xmlns="" xmlns:p14="http://schemas.microsoft.com/office/powerpoint/2010/main" val="202499912"/>
+        <p14:creationId xmlns:p14="http://schemas.microsoft.com/office/powerpoint/2010/main" xmlns="" val="202499912"/>
       </p:ext>
     </p:extLst>
   </p:cSld>
@@ -1897,7 +1897,7 @@
             <a:fld id="{C69E31BE-431C-4F96-86FE-0099C953F73C}" type="datetimeFigureOut">
               <a:rPr lang="en-US" smtClean="0"/>
               <a:pPr/>
-              <a:t>4/2/2015</a:t>
+              <a:t>8/28/2015</a:t>
             </a:fld>
             <a:endParaRPr lang="en-US"/>
           </a:p>
@@ -1949,7 +1949,7 @@
     </p:spTree>
     <p:extLst>
       <p:ext uri="{BB962C8B-B14F-4D97-AF65-F5344CB8AC3E}">
-        <p14:creationId xmlns="" xmlns:p14="http://schemas.microsoft.com/office/powerpoint/2010/main" val="1124304537"/>
+        <p14:creationId xmlns:p14="http://schemas.microsoft.com/office/powerpoint/2010/main" xmlns="" val="1124304537"/>
       </p:ext>
     </p:extLst>
   </p:cSld>
@@ -1994,7 +1994,7 @@
             <a:fld id="{C69E31BE-431C-4F96-86FE-0099C953F73C}" type="datetimeFigureOut">
               <a:rPr lang="en-US" smtClean="0"/>
               <a:pPr/>
-              <a:t>4/2/2015</a:t>
+              <a:t>8/28/2015</a:t>
             </a:fld>
             <a:endParaRPr lang="en-US"/>
           </a:p>
@@ -2046,7 +2046,7 @@
     </p:spTree>
     <p:extLst>
       <p:ext uri="{BB962C8B-B14F-4D97-AF65-F5344CB8AC3E}">
-        <p14:creationId xmlns="" xmlns:p14="http://schemas.microsoft.com/office/powerpoint/2010/main" val="4086690259"/>
+        <p14:creationId xmlns:p14="http://schemas.microsoft.com/office/powerpoint/2010/main" xmlns="" val="4086690259"/>
       </p:ext>
     </p:extLst>
   </p:cSld>
@@ -2273,7 +2273,7 @@
             <a:fld id="{C69E31BE-431C-4F96-86FE-0099C953F73C}" type="datetimeFigureOut">
               <a:rPr lang="en-US" smtClean="0"/>
               <a:pPr/>
-              <a:t>4/2/2015</a:t>
+              <a:t>8/28/2015</a:t>
             </a:fld>
             <a:endParaRPr lang="en-US"/>
           </a:p>
@@ -2325,7 +2325,7 @@
     </p:spTree>
     <p:extLst>
       <p:ext uri="{BB962C8B-B14F-4D97-AF65-F5344CB8AC3E}">
-        <p14:creationId xmlns="" xmlns:p14="http://schemas.microsoft.com/office/powerpoint/2010/main" val="161573557"/>
+        <p14:creationId xmlns:p14="http://schemas.microsoft.com/office/powerpoint/2010/main" xmlns="" val="161573557"/>
       </p:ext>
     </p:extLst>
   </p:cSld>
@@ -2528,7 +2528,7 @@
             <a:fld id="{C69E31BE-431C-4F96-86FE-0099C953F73C}" type="datetimeFigureOut">
               <a:rPr lang="en-US" smtClean="0"/>
               <a:pPr/>
-              <a:t>4/2/2015</a:t>
+              <a:t>8/28/2015</a:t>
             </a:fld>
             <a:endParaRPr lang="en-US"/>
           </a:p>
@@ -2580,7 +2580,7 @@
     </p:spTree>
     <p:extLst>
       <p:ext uri="{BB962C8B-B14F-4D97-AF65-F5344CB8AC3E}">
-        <p14:creationId xmlns="" xmlns:p14="http://schemas.microsoft.com/office/powerpoint/2010/main" val="1090656924"/>
+        <p14:creationId xmlns:p14="http://schemas.microsoft.com/office/powerpoint/2010/main" xmlns="" val="1090656924"/>
       </p:ext>
     </p:extLst>
   </p:cSld>
@@ -2743,7 +2743,7 @@
             <a:fld id="{C69E31BE-431C-4F96-86FE-0099C953F73C}" type="datetimeFigureOut">
               <a:rPr lang="en-US" smtClean="0"/>
               <a:pPr/>
-              <a:t>4/2/2015</a:t>
+              <a:t>8/28/2015</a:t>
             </a:fld>
             <a:endParaRPr lang="en-US"/>
           </a:p>
@@ -2831,7 +2831,7 @@
     </p:spTree>
     <p:extLst>
       <p:ext uri="{BB962C8B-B14F-4D97-AF65-F5344CB8AC3E}">
-        <p14:creationId xmlns="" xmlns:p14="http://schemas.microsoft.com/office/powerpoint/2010/main" val="2194502168"/>
+        <p14:creationId xmlns:p14="http://schemas.microsoft.com/office/powerpoint/2010/main" xmlns="" val="2194502168"/>
       </p:ext>
     </p:extLst>
   </p:cSld>
@@ -3445,8 +3445,8 @@
         </p:nvSpPr>
         <p:spPr>
           <a:xfrm>
-            <a:off x="1015155" y="5243671"/>
-            <a:ext cx="1334335" cy="597094"/>
+            <a:off x="1015155" y="5158581"/>
+            <a:ext cx="1334335" cy="676910"/>
           </a:xfrm>
           <a:prstGeom prst="roundRect">
             <a:avLst/>
@@ -3483,8 +3483,19 @@
                 <a:ea typeface="ＭＳ Ｐゴシック" pitchFamily="34" charset="-128"/>
                 <a:cs typeface="Calibri" pitchFamily="34" charset="0"/>
               </a:rPr>
-              <a:t>6. EHR system allows for Provider data-entry into the form/template</a:t>
-            </a:r>
+              <a:t>6. EHR system allows for </a:t>
+            </a:r>
+            <a:r>
+              <a:rPr lang="en-US" sz="900" b="1" dirty="0" smtClean="0">
+                <a:ea typeface="ＭＳ Ｐゴシック" pitchFamily="34" charset="-128"/>
+                <a:cs typeface="Calibri" pitchFamily="34" charset="0"/>
+              </a:rPr>
+              <a:t>data-entry and correction of Questionnaire Response</a:t>
+            </a:r>
+            <a:endParaRPr lang="en-US" sz="900" b="1" dirty="0">
+              <a:ea typeface="ＭＳ Ｐゴシック" pitchFamily="34" charset="-128"/>
+              <a:cs typeface="Calibri" pitchFamily="34" charset="0"/>
+            </a:endParaRPr>
           </a:p>
         </p:txBody>
       </p:sp>
@@ -3585,8 +3596,19 @@
                 <a:ea typeface="ＭＳ Ｐゴシック" pitchFamily="34" charset="-128"/>
                 <a:cs typeface="Calibri" pitchFamily="34" charset="0"/>
               </a:rPr>
-              <a:t>7. The EHR system transmits completed structured data in standard format</a:t>
-            </a:r>
+              <a:t>7. The EHR system transmits completed </a:t>
+            </a:r>
+            <a:r>
+              <a:rPr lang="en-US" sz="900" b="1" dirty="0" smtClean="0">
+                <a:ea typeface="ＭＳ Ｐゴシック" pitchFamily="34" charset="-128"/>
+                <a:cs typeface="Calibri" pitchFamily="34" charset="0"/>
+              </a:rPr>
+              <a:t>Questionnaire Response</a:t>
+            </a:r>
+            <a:endParaRPr lang="en-US" sz="900" b="1" dirty="0">
+              <a:ea typeface="ＭＳ Ｐゴシック" pitchFamily="34" charset="-128"/>
+              <a:cs typeface="Calibri" pitchFamily="34" charset="0"/>
+            </a:endParaRPr>
           </a:p>
         </p:txBody>
       </p:sp>
@@ -3636,8 +3658,19 @@
                 <a:ea typeface="ＭＳ Ｐゴシック" pitchFamily="34" charset="-128"/>
                 <a:cs typeface="Calibri" pitchFamily="34" charset="0"/>
               </a:rPr>
-              <a:t>8. The External Data Repository receives the structured data</a:t>
-            </a:r>
+              <a:t>8. The External Data Repository receives the </a:t>
+            </a:r>
+            <a:r>
+              <a:rPr lang="en-US" sz="900" b="1" dirty="0" smtClean="0">
+                <a:ea typeface="ＭＳ Ｐゴシック" pitchFamily="34" charset="-128"/>
+                <a:cs typeface="Calibri" pitchFamily="34" charset="0"/>
+              </a:rPr>
+              <a:t>Questionnaire Response</a:t>
+            </a:r>
+            <a:endParaRPr lang="en-US" sz="900" b="1" dirty="0">
+              <a:ea typeface="ＭＳ Ｐゴシック" pitchFamily="34" charset="-128"/>
+              <a:cs typeface="Calibri" pitchFamily="34" charset="0"/>
+            </a:endParaRPr>
           </a:p>
         </p:txBody>
       </p:sp>
@@ -3688,8 +3721,19 @@
                 <a:ea typeface="ＭＳ Ｐゴシック" pitchFamily="34" charset="-128"/>
                 <a:cs typeface="Calibri" pitchFamily="34" charset="0"/>
               </a:rPr>
-              <a:t>1. EHR system sends request for form/template</a:t>
-            </a:r>
+              <a:t>1. EHR system sends request for </a:t>
+            </a:r>
+            <a:r>
+              <a:rPr lang="en-US" sz="900" b="1" dirty="0" smtClean="0">
+                <a:ea typeface="ＭＳ Ｐゴシック" pitchFamily="34" charset="-128"/>
+                <a:cs typeface="Calibri" pitchFamily="34" charset="0"/>
+              </a:rPr>
+              <a:t>populated Questionnaire Response</a:t>
+            </a:r>
+            <a:endParaRPr lang="en-US" sz="900" b="1" dirty="0" smtClean="0">
+              <a:ea typeface="ＭＳ Ｐゴシック" pitchFamily="34" charset="-128"/>
+              <a:cs typeface="Calibri" pitchFamily="34" charset="0"/>
+            </a:endParaRPr>
           </a:p>
           <a:p>
             <a:pPr algn="ctr" defTabSz="446367" fontAlgn="base">
@@ -3781,8 +3825,19 @@
                 <a:ea typeface="ＭＳ Ｐゴシック" pitchFamily="34" charset="-128"/>
                 <a:cs typeface="Calibri" pitchFamily="34" charset="0"/>
               </a:rPr>
-              <a:t>5. EHR system displays correct form/template</a:t>
-            </a:r>
+              <a:t>5. EHR system displays </a:t>
+            </a:r>
+            <a:r>
+              <a:rPr lang="en-US" sz="900" b="1" dirty="0" smtClean="0">
+                <a:ea typeface="ＭＳ Ｐゴシック" pitchFamily="34" charset="-128"/>
+                <a:cs typeface="Calibri" pitchFamily="34" charset="0"/>
+              </a:rPr>
+              <a:t>partially completed Questionnaire Response</a:t>
+            </a:r>
+            <a:endParaRPr lang="en-US" sz="900" b="1" dirty="0">
+              <a:ea typeface="ＭＳ Ｐゴシック" pitchFamily="34" charset="-128"/>
+              <a:cs typeface="Calibri" pitchFamily="34" charset="0"/>
+            </a:endParaRPr>
           </a:p>
         </p:txBody>
       </p:sp>
@@ -3832,8 +3887,19 @@
                 <a:ea typeface="ＭＳ Ｐゴシック" pitchFamily="34" charset="-128"/>
                 <a:cs typeface="Calibri" pitchFamily="34" charset="0"/>
               </a:rPr>
-              <a:t>3. Form/Template repository sends correct form/template</a:t>
-            </a:r>
+              <a:t>3. Form/Template repository sends </a:t>
+            </a:r>
+            <a:r>
+              <a:rPr lang="en-US" sz="900" b="1" dirty="0" smtClean="0">
+                <a:ea typeface="ＭＳ Ｐゴシック" pitchFamily="34" charset="-128"/>
+                <a:cs typeface="Calibri" pitchFamily="34" charset="0"/>
+              </a:rPr>
+              <a:t>partially populated Questionnaire Response</a:t>
+            </a:r>
+            <a:endParaRPr lang="en-US" sz="900" b="1" dirty="0">
+              <a:ea typeface="ＭＳ Ｐゴシック" pitchFamily="34" charset="-128"/>
+              <a:cs typeface="Calibri" pitchFamily="34" charset="0"/>
+            </a:endParaRPr>
           </a:p>
         </p:txBody>
       </p:sp>
@@ -3920,7 +3986,7 @@
                 <a:ea typeface="ＭＳ Ｐゴシック" pitchFamily="34" charset="-128"/>
                 <a:cs typeface="Calibri" pitchFamily="34" charset="0"/>
               </a:rPr>
-              <a:t>Form </a:t>
+              <a:t>Questionnaire Response </a:t>
             </a:r>
             <a:r>
               <a:rPr lang="en-US" sz="900" b="1" dirty="0">
@@ -3941,7 +4007,14 @@
                 <a:ea typeface="ＭＳ Ｐゴシック" pitchFamily="34" charset="-128"/>
                 <a:cs typeface="Calibri" pitchFamily="34" charset="0"/>
               </a:rPr>
-              <a:t>with some EHR-derived </a:t>
+              <a:t>with </a:t>
+            </a:r>
+            <a:r>
+              <a:rPr lang="en-US" sz="900" b="1" dirty="0" smtClean="0">
+                <a:ea typeface="ＭＳ Ｐゴシック" pitchFamily="34" charset="-128"/>
+                <a:cs typeface="Calibri" pitchFamily="34" charset="0"/>
+              </a:rPr>
+              <a:t>EHR-derived </a:t>
             </a:r>
             <a:r>
               <a:rPr lang="en-US" sz="900" b="1" dirty="0" smtClean="0">
@@ -4004,7 +4077,28 @@
                 <a:ea typeface="ＭＳ Ｐゴシック" pitchFamily="34" charset="-128"/>
                 <a:cs typeface="Calibri" pitchFamily="34" charset="0"/>
               </a:rPr>
-              <a:t>2. Form/Template repository receives request for form/template</a:t>
+              <a:t>2. </a:t>
+            </a:r>
+            <a:r>
+              <a:rPr lang="en-US" sz="900" b="1" dirty="0" smtClean="0">
+                <a:ea typeface="ＭＳ Ｐゴシック" pitchFamily="34" charset="-128"/>
+                <a:cs typeface="Calibri" pitchFamily="34" charset="0"/>
+              </a:rPr>
+              <a:t>Form repository </a:t>
+            </a:r>
+            <a:r>
+              <a:rPr lang="en-US" sz="900" b="1" dirty="0" smtClean="0">
+                <a:ea typeface="ＭＳ Ｐゴシック" pitchFamily="34" charset="-128"/>
+                <a:cs typeface="Calibri" pitchFamily="34" charset="0"/>
+              </a:rPr>
+              <a:t>receives request for </a:t>
+            </a:r>
+            <a:r>
+              <a:rPr lang="en-US" sz="900" b="1" dirty="0" smtClean="0">
+                <a:ea typeface="ＭＳ Ｐゴシック" pitchFamily="34" charset="-128"/>
+                <a:cs typeface="Calibri" pitchFamily="34" charset="0"/>
+              </a:rPr>
+              <a:t>populated Questionnaire Response</a:t>
             </a:r>
             <a:endParaRPr lang="en-US" sz="900" b="1" dirty="0">
               <a:ea typeface="ＭＳ Ｐゴシック" pitchFamily="34" charset="-128"/>
@@ -4059,7 +4153,21 @@
                 <a:ea typeface="ＭＳ Ｐゴシック" pitchFamily="34" charset="-128"/>
                 <a:cs typeface="Calibri" pitchFamily="34" charset="0"/>
               </a:rPr>
-              <a:t>9. The External Data Repository stores the structured data in standard format</a:t>
+              <a:t>9. The External Data Repository stores the </a:t>
+            </a:r>
+            <a:r>
+              <a:rPr lang="en-US" sz="900" b="1" dirty="0" smtClean="0">
+                <a:ea typeface="ＭＳ Ｐゴシック" pitchFamily="34" charset="-128"/>
+                <a:cs typeface="Calibri" pitchFamily="34" charset="0"/>
+              </a:rPr>
+              <a:t>Questionnaire Response </a:t>
+            </a:r>
+            <a:r>
+              <a:rPr lang="en-US" sz="900" b="1" dirty="0">
+                <a:ea typeface="ＭＳ Ｐゴシック" pitchFamily="34" charset="-128"/>
+                <a:cs typeface="Calibri" pitchFamily="34" charset="0"/>
+              </a:rPr>
+              <a:t>in standard format</a:t>
             </a:r>
           </a:p>
         </p:txBody>
@@ -4218,8 +4326,8 @@
         </p:nvCxnSpPr>
         <p:spPr>
           <a:xfrm>
-            <a:off x="1682321" y="5094398"/>
-            <a:ext cx="0" cy="149273"/>
+            <a:off x="1682323" y="5094398"/>
+            <a:ext cx="0" cy="64183"/>
           </a:xfrm>
           <a:prstGeom prst="straightConnector1">
             <a:avLst/>
@@ -4254,8 +4362,8 @@
         </p:nvCxnSpPr>
         <p:spPr>
           <a:xfrm>
-            <a:off x="1682321" y="5840767"/>
-            <a:ext cx="0" cy="149273"/>
+            <a:off x="1682323" y="5835491"/>
+            <a:ext cx="0" cy="154550"/>
           </a:xfrm>
           <a:prstGeom prst="straightConnector1">
             <a:avLst/>
@@ -4433,8 +4541,19 @@
                 <a:ea typeface="ＭＳ Ｐゴシック" pitchFamily="34" charset="-128"/>
                 <a:cs typeface="Calibri" pitchFamily="34" charset="0"/>
               </a:rPr>
-              <a:t>4. EHR System receives correct form/template</a:t>
-            </a:r>
+              <a:t>4. EHR System receives correct </a:t>
+            </a:r>
+            <a:r>
+              <a:rPr lang="en-US" sz="900" b="1" dirty="0" smtClean="0">
+                <a:ea typeface="ＭＳ Ｐゴシック" pitchFamily="34" charset="-128"/>
+                <a:cs typeface="Calibri" pitchFamily="34" charset="0"/>
+              </a:rPr>
+              <a:t>Questionnaire Response</a:t>
+            </a:r>
+            <a:endParaRPr lang="en-US" sz="900" b="1" dirty="0">
+              <a:ea typeface="ＭＳ Ｐゴシック" pitchFamily="34" charset="-128"/>
+              <a:cs typeface="Calibri" pitchFamily="34" charset="0"/>
+            </a:endParaRPr>
           </a:p>
         </p:txBody>
       </p:sp>
@@ -4557,7 +4676,7 @@
                 <a:ea typeface="ＭＳ Ｐゴシック" pitchFamily="34" charset="-128"/>
                 <a:cs typeface="Calibri" pitchFamily="34" charset="0"/>
               </a:rPr>
-              <a:t>Form </a:t>
+              <a:t>Questionnaire Response </a:t>
             </a:r>
             <a:r>
               <a:rPr lang="en-US" sz="900" b="1" dirty="0">
@@ -4578,14 +4697,21 @@
                 <a:ea typeface="ＭＳ Ｐゴシック" pitchFamily="34" charset="-128"/>
                 <a:cs typeface="Calibri" pitchFamily="34" charset="0"/>
               </a:rPr>
-              <a:t>with some </a:t>
+              <a:t>with </a:t>
             </a:r>
             <a:r>
               <a:rPr lang="en-US" sz="900" b="1" dirty="0" smtClean="0">
                 <a:ea typeface="ＭＳ Ｐゴシック" pitchFamily="34" charset="-128"/>
                 <a:cs typeface="Calibri" pitchFamily="34" charset="0"/>
               </a:rPr>
-              <a:t>EHR-provided patient data</a:t>
+              <a:t>EHR-provided </a:t>
+            </a:r>
+            <a:r>
+              <a:rPr lang="en-US" sz="900" b="1" dirty="0" smtClean="0">
+                <a:ea typeface="ＭＳ Ｐゴシック" pitchFamily="34" charset="-128"/>
+                <a:cs typeface="Calibri" pitchFamily="34" charset="0"/>
+              </a:rPr>
+              <a:t>patient data</a:t>
             </a:r>
             <a:endParaRPr lang="en-US" sz="900" b="1" dirty="0">
               <a:ea typeface="ＭＳ Ｐゴシック" pitchFamily="34" charset="-128"/>
@@ -4822,7 +4948,7 @@
     </p:spTree>
     <p:extLst>
       <p:ext uri="{BB962C8B-B14F-4D97-AF65-F5344CB8AC3E}">
-        <p14:creationId xmlns="" xmlns:p14="http://schemas.microsoft.com/office/powerpoint/2010/main" val="779856399"/>
+        <p14:creationId xmlns:p14="http://schemas.microsoft.com/office/powerpoint/2010/main" xmlns="" val="779856399"/>
       </p:ext>
     </p:extLst>
   </p:cSld>
@@ -5118,9 +5244,12 @@
 </file>
 
 <file path=customXml/item1.xml><?xml version="1.0" encoding="utf-8"?>
-<p:properties xmlns:p="http://schemas.microsoft.com/office/2006/metadata/properties" xmlns:xsi="http://www.w3.org/2001/XMLSchema-instance">
-  <documentManagement/>
-</p:properties>
+<?mso-contentType ?>
+<FormTemplates xmlns="http://schemas.microsoft.com/sharepoint/v3/contenttype/forms">
+  <Display>DocumentLibraryForm</Display>
+  <Edit>DocumentLibraryForm</Edit>
+  <New>DocumentLibraryForm</New>
+</FormTemplates>
 </file>
 
 <file path=customXml/item2.xml><?xml version="1.0" encoding="utf-8"?>
@@ -5173,24 +5302,15 @@
 </file>
 
 <file path=customXml/item3.xml><?xml version="1.0" encoding="utf-8"?>
-<?mso-contentType ?>
-<FormTemplates xmlns="http://schemas.microsoft.com/sharepoint/v3/contenttype/forms">
-  <Display>DocumentLibraryForm</Display>
-  <Edit>DocumentLibraryForm</Edit>
-  <New>DocumentLibraryForm</New>
-</FormTemplates>
+<p:properties xmlns:p="http://schemas.microsoft.com/office/2006/metadata/properties" xmlns:xsi="http://www.w3.org/2001/XMLSchema-instance">
+  <documentManagement/>
+</p:properties>
 </file>
 
 <file path=customXml/itemProps1.xml><?xml version="1.0" encoding="utf-8"?>
-<ds:datastoreItem xmlns:ds="http://schemas.openxmlformats.org/officeDocument/2006/customXml" ds:itemID="{AA05AFCB-176E-411D-8F54-3F7328DC8DF9}">
+<ds:datastoreItem xmlns:ds="http://schemas.openxmlformats.org/officeDocument/2006/customXml" ds:itemID="{93867DCD-913B-4BE7-B218-6A941DDB47CC}">
   <ds:schemaRefs>
-    <ds:schemaRef ds:uri="http://schemas.microsoft.com/office/2006/documentManagement/types"/>
-    <ds:schemaRef ds:uri="http://purl.org/dc/terms/"/>
-    <ds:schemaRef ds:uri="http://schemas.microsoft.com/office/2006/metadata/properties"/>
-    <ds:schemaRef ds:uri="http://purl.org/dc/dcmitype/"/>
-    <ds:schemaRef ds:uri="http://www.w3.org/XML/1998/namespace"/>
-    <ds:schemaRef ds:uri="http://schemas.openxmlformats.org/package/2006/metadata/core-properties"/>
-    <ds:schemaRef ds:uri="http://purl.org/dc/elements/1.1/"/>
+    <ds:schemaRef ds:uri="http://schemas.microsoft.com/sharepoint/v3/contenttype/forms"/>
   </ds:schemaRefs>
 </ds:datastoreItem>
 </file>
@@ -5211,9 +5331,15 @@
 </file>
 
 <file path=customXml/itemProps3.xml><?xml version="1.0" encoding="utf-8"?>
-<ds:datastoreItem xmlns:ds="http://schemas.openxmlformats.org/officeDocument/2006/customXml" ds:itemID="{93867DCD-913B-4BE7-B218-6A941DDB47CC}">
+<ds:datastoreItem xmlns:ds="http://schemas.openxmlformats.org/officeDocument/2006/customXml" ds:itemID="{AA05AFCB-176E-411D-8F54-3F7328DC8DF9}">
   <ds:schemaRefs>
-    <ds:schemaRef ds:uri="http://schemas.microsoft.com/sharepoint/v3/contenttype/forms"/>
+    <ds:schemaRef ds:uri="http://schemas.microsoft.com/office/2006/documentManagement/types"/>
+    <ds:schemaRef ds:uri="http://purl.org/dc/terms/"/>
+    <ds:schemaRef ds:uri="http://schemas.microsoft.com/office/2006/metadata/properties"/>
+    <ds:schemaRef ds:uri="http://purl.org/dc/dcmitype/"/>
+    <ds:schemaRef ds:uri="http://www.w3.org/XML/1998/namespace"/>
+    <ds:schemaRef ds:uri="http://schemas.openxmlformats.org/package/2006/metadata/core-properties"/>
+    <ds:schemaRef ds:uri="http://purl.org/dc/elements/1.1/"/>
   </ds:schemaRefs>
 </ds:datastoreItem>
 </file>
</xml_diff>